<commit_message>
removed NeweggAmazon added NeweggAmazonfinal
Final changes to code
NeweggFinal works for just Newegg, NeweggAmazon works for both.
Added more slides to powerpoint
</commit_message>
<xml_diff>
--- a/SentimentAnalysisProj.pptx
+++ b/SentimentAnalysisProj.pptx
@@ -8,11 +8,13 @@
     <p:sldId id="256" r:id="rId2"/>
     <p:sldId id="257" r:id="rId3"/>
     <p:sldId id="258" r:id="rId4"/>
-    <p:sldId id="260" r:id="rId5"/>
-    <p:sldId id="259" r:id="rId6"/>
-    <p:sldId id="261" r:id="rId7"/>
-    <p:sldId id="262" r:id="rId8"/>
-    <p:sldId id="263" r:id="rId9"/>
+    <p:sldId id="265" r:id="rId5"/>
+    <p:sldId id="260" r:id="rId6"/>
+    <p:sldId id="259" r:id="rId7"/>
+    <p:sldId id="261" r:id="rId8"/>
+    <p:sldId id="262" r:id="rId9"/>
+    <p:sldId id="263" r:id="rId10"/>
+    <p:sldId id="264" r:id="rId11"/>
   </p:sldIdLst>
   <p:sldSz cx="12192000" cy="6858000"/>
   <p:notesSz cx="6858000" cy="9144000"/>
@@ -268,7 +270,7 @@
           <a:p>
             <a:fld id="{C43A76A3-ADC8-4477-8FC1-B9DD55D84908}" type="datetime1">
               <a:rPr lang="en-US" smtClean="0"/>
-              <a:t>12/7/2021</a:t>
+              <a:t>12/8/2021</a:t>
             </a:fld>
             <a:endParaRPr lang="en-US" dirty="0"/>
           </a:p>
@@ -466,7 +468,7 @@
           <a:p>
             <a:fld id="{D6762538-DC4D-4667-96E5-B3278DDF8B12}" type="datetime1">
               <a:rPr lang="en-US" smtClean="0"/>
-              <a:t>12/7/2021</a:t>
+              <a:t>12/8/2021</a:t>
             </a:fld>
             <a:endParaRPr lang="en-US"/>
           </a:p>
@@ -674,7 +676,7 @@
           <a:p>
             <a:fld id="{05880548-5C08-4BE3-B63E-F2BB63B0B00C}" type="datetime1">
               <a:rPr lang="en-US" smtClean="0"/>
-              <a:t>12/7/2021</a:t>
+              <a:t>12/8/2021</a:t>
             </a:fld>
             <a:endParaRPr lang="en-US"/>
           </a:p>
@@ -872,7 +874,7 @@
           <a:p>
             <a:fld id="{DE7F49BE-398D-479A-8A7E-5DDBCA61EDCB}" type="datetime1">
               <a:rPr lang="en-US" smtClean="0"/>
-              <a:t>12/7/2021</a:t>
+              <a:t>12/8/2021</a:t>
             </a:fld>
             <a:endParaRPr lang="en-US"/>
           </a:p>
@@ -1148,7 +1150,7 @@
           <a:p>
             <a:fld id="{CCD0C193-4974-4A1F-9C63-07D595E30D66}" type="datetime1">
               <a:rPr lang="en-US" smtClean="0"/>
-              <a:t>12/7/2021</a:t>
+              <a:t>12/8/2021</a:t>
             </a:fld>
             <a:endParaRPr lang="en-US"/>
           </a:p>
@@ -1415,7 +1417,7 @@
           <a:p>
             <a:fld id="{701AA87F-28D4-4BF0-B81F-877A89DFD5AC}" type="datetime1">
               <a:rPr lang="en-US" smtClean="0"/>
-              <a:t>12/7/2021</a:t>
+              <a:t>12/8/2021</a:t>
             </a:fld>
             <a:endParaRPr lang="en-US"/>
           </a:p>
@@ -1829,7 +1831,7 @@
           <a:p>
             <a:fld id="{A8A9F1F3-208B-49A3-B337-9C8ACEB3E0E1}" type="datetime1">
               <a:rPr lang="en-US" smtClean="0"/>
-              <a:t>12/7/2021</a:t>
+              <a:t>12/8/2021</a:t>
             </a:fld>
             <a:endParaRPr lang="en-US"/>
           </a:p>
@@ -1976,7 +1978,7 @@
           <a:p>
             <a:fld id="{27AF6CA6-7293-4AA2-A0E0-A3BF4416E786}" type="datetime1">
               <a:rPr lang="en-US" smtClean="0"/>
-              <a:t>12/7/2021</a:t>
+              <a:t>12/8/2021</a:t>
             </a:fld>
             <a:endParaRPr lang="en-US"/>
           </a:p>
@@ -2089,7 +2091,7 @@
           <a:p>
             <a:fld id="{98D87016-7BCD-46FB-8EE3-AB6C369108B4}" type="datetime1">
               <a:rPr lang="en-US" smtClean="0"/>
-              <a:t>12/7/2021</a:t>
+              <a:t>12/8/2021</a:t>
             </a:fld>
             <a:endParaRPr lang="en-US"/>
           </a:p>
@@ -2408,7 +2410,7 @@
           <a:p>
             <a:fld id="{A1547011-1FFC-4EF8-9A2E-53B4AD2ADBD4}" type="datetime1">
               <a:rPr lang="en-US" smtClean="0"/>
-              <a:t>12/7/2021</a:t>
+              <a:t>12/8/2021</a:t>
             </a:fld>
             <a:endParaRPr lang="en-US"/>
           </a:p>
@@ -2703,7 +2705,7 @@
           <a:p>
             <a:fld id="{9562EB47-45B4-4EF5-A743-B4885DD2F060}" type="datetime1">
               <a:rPr lang="en-US" smtClean="0"/>
-              <a:t>12/7/2021</a:t>
+              <a:t>12/8/2021</a:t>
             </a:fld>
             <a:endParaRPr lang="en-US"/>
           </a:p>
@@ -4088,7 +4090,7 @@
           <a:p>
             <a:fld id="{4A8D24A4-5FEC-4062-8995-EB21925B3B40}" type="datetime1">
               <a:rPr lang="en-US" smtClean="0"/>
-              <a:t>12/7/2021</a:t>
+              <a:t>12/8/2021</a:t>
             </a:fld>
             <a:endParaRPr lang="en-US" sz="1000" dirty="0"/>
           </a:p>
@@ -5283,6 +5285,120 @@
 </p:sld>
 </file>
 
+<file path=ppt/slides/slide10.xml><?xml version="1.0" encoding="utf-8"?>
+<p:sld xmlns:a="http://schemas.openxmlformats.org/drawingml/2006/main" xmlns:r="http://schemas.openxmlformats.org/officeDocument/2006/relationships" xmlns:p="http://schemas.openxmlformats.org/presentationml/2006/main">
+  <p:cSld>
+    <p:spTree>
+      <p:nvGrpSpPr>
+        <p:cNvPr id="1" name=""/>
+        <p:cNvGrpSpPr/>
+        <p:nvPr/>
+      </p:nvGrpSpPr>
+      <p:grpSpPr>
+        <a:xfrm>
+          <a:off x="0" y="0"/>
+          <a:ext cx="0" cy="0"/>
+          <a:chOff x="0" y="0"/>
+          <a:chExt cx="0" cy="0"/>
+        </a:xfrm>
+      </p:grpSpPr>
+      <p:sp>
+        <p:nvSpPr>
+          <p:cNvPr id="2" name="Title 1">
+            <a:extLst>
+              <a:ext uri="{FF2B5EF4-FFF2-40B4-BE49-F238E27FC236}">
+                <a16:creationId xmlns:a16="http://schemas.microsoft.com/office/drawing/2014/main" id="{7227D2BE-1E6E-49F8-B195-439ECE856AA3}"/>
+              </a:ext>
+            </a:extLst>
+          </p:cNvPr>
+          <p:cNvSpPr>
+            <a:spLocks noGrp="1"/>
+          </p:cNvSpPr>
+          <p:nvPr>
+            <p:ph type="title"/>
+          </p:nvPr>
+        </p:nvSpPr>
+        <p:spPr/>
+        <p:txBody>
+          <a:bodyPr/>
+          <a:lstStyle/>
+          <a:p>
+            <a:r>
+              <a:rPr lang="en-US" dirty="0"/>
+              <a:t>In conclusion…</a:t>
+            </a:r>
+          </a:p>
+        </p:txBody>
+      </p:sp>
+      <p:sp>
+        <p:nvSpPr>
+          <p:cNvPr id="3" name="Content Placeholder 2">
+            <a:extLst>
+              <a:ext uri="{FF2B5EF4-FFF2-40B4-BE49-F238E27FC236}">
+                <a16:creationId xmlns:a16="http://schemas.microsoft.com/office/drawing/2014/main" id="{772784FA-B13B-46C2-A788-DBDB36DE24BE}"/>
+              </a:ext>
+            </a:extLst>
+          </p:cNvPr>
+          <p:cNvSpPr>
+            <a:spLocks noGrp="1"/>
+          </p:cNvSpPr>
+          <p:nvPr>
+            <p:ph idx="1"/>
+          </p:nvPr>
+        </p:nvSpPr>
+        <p:spPr/>
+        <p:txBody>
+          <a:bodyPr>
+            <a:normAutofit/>
+          </a:bodyPr>
+          <a:lstStyle/>
+          <a:p>
+            <a:pPr marL="0" indent="0">
+              <a:buNone/>
+            </a:pPr>
+            <a:r>
+              <a:rPr lang="en-US" sz="3200" dirty="0"/>
+              <a:t>After testing several different product review pages, we concluded that although TextBlob and NLP is a neat tool, it is not an accurate representation of a customer’s review.</a:t>
+            </a:r>
+          </a:p>
+          <a:p>
+            <a:pPr marL="0" indent="0">
+              <a:buNone/>
+            </a:pPr>
+            <a:endParaRPr lang="en-US" sz="3200" dirty="0"/>
+          </a:p>
+          <a:p>
+            <a:pPr marL="0" indent="0">
+              <a:buNone/>
+            </a:pPr>
+            <a:r>
+              <a:rPr lang="en-US" sz="3200" dirty="0"/>
+              <a:t>We learned how to install a Library not included in Anaconda, and how to scrape web data using </a:t>
+            </a:r>
+            <a:r>
+              <a:rPr lang="en-US" sz="3200" dirty="0" err="1"/>
+              <a:t>BeautifulSoup</a:t>
+            </a:r>
+            <a:r>
+              <a:rPr lang="en-US" sz="3200" dirty="0"/>
+              <a:t>. We worked on converting a dictionary into a list, importing it into a csv file, and having TextBlob do the rest.</a:t>
+            </a:r>
+          </a:p>
+        </p:txBody>
+      </p:sp>
+    </p:spTree>
+    <p:extLst>
+      <p:ext uri="{BB962C8B-B14F-4D97-AF65-F5344CB8AC3E}">
+        <p14:creationId xmlns:p14="http://schemas.microsoft.com/office/powerpoint/2010/main" val="1137593566"/>
+      </p:ext>
+    </p:extLst>
+  </p:cSld>
+  <p:clrMapOvr>
+    <a:masterClrMapping/>
+  </p:clrMapOvr>
+</p:sld>
+</file>
+
 <file path=ppt/slides/slide2.xml><?xml version="1.0" encoding="utf-8"?>
 <p:sld xmlns:a="http://schemas.openxmlformats.org/drawingml/2006/main" xmlns:r="http://schemas.openxmlformats.org/officeDocument/2006/relationships" xmlns:p="http://schemas.openxmlformats.org/presentationml/2006/main">
   <p:cSld>
@@ -5355,14 +5471,8 @@
             </a:pPr>
             <a:r>
               <a:rPr lang="en-US" sz="3200" dirty="0"/>
-              <a:t>Our idea for the CSIT-200 Fall 2021 Group Project was to create a program that scrapes web data for customer reviews on Newegg product pages.</a:t>
-            </a:r>
-          </a:p>
-          <a:p>
-            <a:pPr marL="0" indent="0">
-              <a:buNone/>
-            </a:pPr>
-            <a:endParaRPr lang="en-US" sz="3200" dirty="0"/>
+              <a:t>Our idea for the CSIT-200 Fall 2021 Group Project was to create a program that scrapes web data for customer reviews on Newegg product pages. With some great progress from Bernard, we were able to scrape Amazon’s review data as well.</a:t>
+            </a:r>
           </a:p>
           <a:p>
             <a:pPr marL="0" indent="0">
@@ -5552,6 +5662,106 @@
           <p:cNvPr id="2" name="Title 1">
             <a:extLst>
               <a:ext uri="{FF2B5EF4-FFF2-40B4-BE49-F238E27FC236}">
+                <a16:creationId xmlns:a16="http://schemas.microsoft.com/office/drawing/2014/main" id="{4C253460-8E64-4E6F-9782-AB9E848842DC}"/>
+              </a:ext>
+            </a:extLst>
+          </p:cNvPr>
+          <p:cNvSpPr>
+            <a:spLocks noGrp="1"/>
+          </p:cNvSpPr>
+          <p:nvPr>
+            <p:ph type="title"/>
+          </p:nvPr>
+        </p:nvSpPr>
+        <p:spPr/>
+        <p:txBody>
+          <a:bodyPr/>
+          <a:lstStyle/>
+          <a:p>
+            <a:r>
+              <a:rPr lang="en-US" dirty="0"/>
+              <a:t>How TextBlob Works</a:t>
+            </a:r>
+          </a:p>
+        </p:txBody>
+      </p:sp>
+      <p:sp>
+        <p:nvSpPr>
+          <p:cNvPr id="3" name="Content Placeholder 2">
+            <a:extLst>
+              <a:ext uri="{FF2B5EF4-FFF2-40B4-BE49-F238E27FC236}">
+                <a16:creationId xmlns:a16="http://schemas.microsoft.com/office/drawing/2014/main" id="{42E71A29-0EA8-44CB-8211-1B7E10B7EAA1}"/>
+              </a:ext>
+            </a:extLst>
+          </p:cNvPr>
+          <p:cNvSpPr>
+            <a:spLocks noGrp="1"/>
+          </p:cNvSpPr>
+          <p:nvPr>
+            <p:ph idx="1"/>
+          </p:nvPr>
+        </p:nvSpPr>
+        <p:spPr/>
+        <p:txBody>
+          <a:bodyPr>
+            <a:normAutofit/>
+          </a:bodyPr>
+          <a:lstStyle/>
+          <a:p>
+            <a:r>
+              <a:rPr lang="en-US" sz="3200" dirty="0"/>
+              <a:t>TextBlob is a simple Natural Language Processing python library. It actively uses an NLTK Dictionary of words, which classify into positive and negative words</a:t>
+            </a:r>
+          </a:p>
+          <a:p>
+            <a:r>
+              <a:rPr lang="en-US" sz="3200" dirty="0"/>
+              <a:t>When reading text, each word parsed has a pre-defined sentiment score. Upon reaching the end of the text, all word scores are compiled and return a single sentiment score, on a scale of -1  to  1. </a:t>
+            </a:r>
+          </a:p>
+          <a:p>
+            <a:r>
+              <a:rPr lang="en-US" sz="3200" dirty="0"/>
+              <a:t>-1 = 1 stars, -.5 = 2 stars, 0 = 3 stars, .5 = 4 stars, 1 = 5 stars</a:t>
+            </a:r>
+          </a:p>
+        </p:txBody>
+      </p:sp>
+    </p:spTree>
+    <p:extLst>
+      <p:ext uri="{BB962C8B-B14F-4D97-AF65-F5344CB8AC3E}">
+        <p14:creationId xmlns:p14="http://schemas.microsoft.com/office/powerpoint/2010/main" val="3735084782"/>
+      </p:ext>
+    </p:extLst>
+  </p:cSld>
+  <p:clrMapOvr>
+    <a:masterClrMapping/>
+  </p:clrMapOvr>
+</p:sld>
+</file>
+
+<file path=ppt/slides/slide5.xml><?xml version="1.0" encoding="utf-8"?>
+<p:sld xmlns:a="http://schemas.openxmlformats.org/drawingml/2006/main" xmlns:r="http://schemas.openxmlformats.org/officeDocument/2006/relationships" xmlns:p="http://schemas.openxmlformats.org/presentationml/2006/main">
+  <p:cSld>
+    <p:spTree>
+      <p:nvGrpSpPr>
+        <p:cNvPr id="1" name=""/>
+        <p:cNvGrpSpPr/>
+        <p:nvPr/>
+      </p:nvGrpSpPr>
+      <p:grpSpPr>
+        <a:xfrm>
+          <a:off x="0" y="0"/>
+          <a:ext cx="0" cy="0"/>
+          <a:chOff x="0" y="0"/>
+          <a:chExt cx="0" cy="0"/>
+        </a:xfrm>
+      </p:grpSpPr>
+      <p:sp>
+        <p:nvSpPr>
+          <p:cNvPr id="2" name="Title 1">
+            <a:extLst>
+              <a:ext uri="{FF2B5EF4-FFF2-40B4-BE49-F238E27FC236}">
                 <a16:creationId xmlns:a16="http://schemas.microsoft.com/office/drawing/2014/main" id="{F72F0FDA-11AE-46A5-89F9-AF3DF6E7F9D1}"/>
               </a:ext>
             </a:extLst>
@@ -5720,7 +5930,7 @@
 </p:sld>
 </file>
 
-<file path=ppt/slides/slide5.xml><?xml version="1.0" encoding="utf-8"?>
+<file path=ppt/slides/slide6.xml><?xml version="1.0" encoding="utf-8"?>
 <p:sld xmlns:a="http://schemas.openxmlformats.org/drawingml/2006/main" xmlns:r="http://schemas.openxmlformats.org/officeDocument/2006/relationships" xmlns:p="http://schemas.openxmlformats.org/presentationml/2006/main">
   <p:cSld>
     <p:spTree>
@@ -5891,7 +6101,7 @@
 </p:sld>
 </file>
 
-<file path=ppt/slides/slide6.xml><?xml version="1.0" encoding="utf-8"?>
+<file path=ppt/slides/slide7.xml><?xml version="1.0" encoding="utf-8"?>
 <p:sld xmlns:a="http://schemas.openxmlformats.org/drawingml/2006/main" xmlns:r="http://schemas.openxmlformats.org/officeDocument/2006/relationships" xmlns:p="http://schemas.openxmlformats.org/presentationml/2006/main">
   <p:cSld>
     <p:spTree>
@@ -6103,7 +6313,7 @@
 </p:sld>
 </file>
 
-<file path=ppt/slides/slide7.xml><?xml version="1.0" encoding="utf-8"?>
+<file path=ppt/slides/slide8.xml><?xml version="1.0" encoding="utf-8"?>
 <p:sld xmlns:a="http://schemas.openxmlformats.org/drawingml/2006/main" xmlns:r="http://schemas.openxmlformats.org/officeDocument/2006/relationships" xmlns:p="http://schemas.openxmlformats.org/presentationml/2006/main">
   <p:cSld>
     <p:spTree>
@@ -6285,7 +6495,7 @@
 </p:sld>
 </file>
 
-<file path=ppt/slides/slide8.xml><?xml version="1.0" encoding="utf-8"?>
+<file path=ppt/slides/slide9.xml><?xml version="1.0" encoding="utf-8"?>
 <p:sld xmlns:a="http://schemas.openxmlformats.org/drawingml/2006/main" xmlns:r="http://schemas.openxmlformats.org/officeDocument/2006/relationships" xmlns:p="http://schemas.openxmlformats.org/presentationml/2006/main">
   <p:cSld>
     <p:spTree>
@@ -6307,7 +6517,7 @@
           <p:cNvPr id="2" name="Title 1">
             <a:extLst>
               <a:ext uri="{FF2B5EF4-FFF2-40B4-BE49-F238E27FC236}">
-                <a16:creationId xmlns:a16="http://schemas.microsoft.com/office/drawing/2014/main" id="{E29C12C6-8B9D-4FE6-B96D-28C2E6C9C691}"/>
+                <a16:creationId xmlns:a16="http://schemas.microsoft.com/office/drawing/2014/main" id="{5EB6D36B-0910-4839-8486-70EFF4B756C3}"/>
               </a:ext>
             </a:extLst>
           </p:cNvPr>
@@ -6318,46 +6528,146 @@
             <p:ph type="title"/>
           </p:nvPr>
         </p:nvSpPr>
+        <p:spPr/>
+        <p:txBody>
+          <a:bodyPr/>
+          <a:lstStyle/>
+          <a:p>
+            <a:r>
+              <a:rPr lang="en-US" dirty="0"/>
+              <a:t>Testing an Amazon Product</a:t>
+            </a:r>
+          </a:p>
+        </p:txBody>
+      </p:sp>
+      <p:pic>
+        <p:nvPicPr>
+          <p:cNvPr id="5" name="Content Placeholder 4" descr="Text&#10;&#10;Description automatically generated">
+            <a:extLst>
+              <a:ext uri="{FF2B5EF4-FFF2-40B4-BE49-F238E27FC236}">
+                <a16:creationId xmlns:a16="http://schemas.microsoft.com/office/drawing/2014/main" id="{505462DC-8425-49E1-815E-86B91123FCD7}"/>
+              </a:ext>
+            </a:extLst>
+          </p:cNvPr>
+          <p:cNvPicPr>
+            <a:picLocks noGrp="1" noChangeAspect="1"/>
+          </p:cNvPicPr>
+          <p:nvPr>
+            <p:ph idx="1"/>
+          </p:nvPr>
+        </p:nvPicPr>
+        <p:blipFill>
+          <a:blip r:embed="rId2">
+            <a:extLst>
+              <a:ext uri="{28A0092B-C50C-407E-A947-70E740481C1C}">
+                <a14:useLocalDpi xmlns:a14="http://schemas.microsoft.com/office/drawing/2010/main" val="0"/>
+              </a:ext>
+            </a:extLst>
+          </a:blip>
+          <a:stretch>
+            <a:fillRect/>
+          </a:stretch>
+        </p:blipFill>
         <p:spPr>
           <a:xfrm>
-            <a:off x="564803" y="2535671"/>
-            <a:ext cx="10659110" cy="1325563"/>
+            <a:off x="5826178" y="1422401"/>
+            <a:ext cx="4936158" cy="2188194"/>
           </a:xfrm>
         </p:spPr>
-        <p:txBody>
-          <a:bodyPr>
-            <a:normAutofit fontScale="90000"/>
+      </p:pic>
+      <p:sp>
+        <p:nvSpPr>
+          <p:cNvPr id="6" name="TextBox 5">
+            <a:extLst>
+              <a:ext uri="{FF2B5EF4-FFF2-40B4-BE49-F238E27FC236}">
+                <a16:creationId xmlns:a16="http://schemas.microsoft.com/office/drawing/2014/main" id="{10A21210-C41B-4B0D-A152-7DBBFCD12B82}"/>
+              </a:ext>
+            </a:extLst>
+          </p:cNvPr>
+          <p:cNvSpPr txBox="1"/>
+          <p:nvPr/>
+        </p:nvSpPr>
+        <p:spPr>
+          <a:xfrm>
+            <a:off x="895927" y="1884218"/>
+            <a:ext cx="4100946" cy="2585323"/>
+          </a:xfrm>
+          <a:prstGeom prst="rect">
+            <a:avLst/>
+          </a:prstGeom>
+          <a:noFill/>
+        </p:spPr>
+        <p:txBody>
+          <a:bodyPr wrap="square" rtlCol="0">
+            <a:spAutoFit/>
           </a:bodyPr>
           <a:lstStyle/>
           <a:p>
             <a:r>
               <a:rPr lang="en-US" dirty="0"/>
-              <a:t>Find all function beautiful soup div tags are labeled with class</a:t>
-            </a:r>
-            <a:br>
+              <a:t>For amazon to work, we must go directly to the Products’ Review page and copy the link for our input.</a:t>
+            </a:r>
+          </a:p>
+          <a:p>
+            <a:endParaRPr lang="en-US" dirty="0"/>
+          </a:p>
+          <a:p>
+            <a:r>
               <a:rPr lang="en-US" dirty="0"/>
-            </a:br>
-            <a:r>
-              <a:rPr lang="en-US" dirty="0"/>
-              <a:t>amazon tags has an ID specific to review</a:t>
-            </a:r>
-            <a:br>
-              <a:rPr lang="en-US" dirty="0"/>
-            </a:br>
-            <a:br>
-              <a:rPr lang="en-US" dirty="0"/>
-            </a:br>
-            <a:br>
-              <a:rPr lang="en-US" dirty="0"/>
-            </a:br>
+              <a:t>Here we can see many review sentiments for a graphics card product.</a:t>
+            </a:r>
+          </a:p>
+          <a:p>
             <a:endParaRPr lang="en-US" dirty="0"/>
           </a:p>
-        </p:txBody>
-      </p:sp>
+          <a:p>
+            <a:endParaRPr lang="en-US" dirty="0"/>
+          </a:p>
+          <a:p>
+            <a:endParaRPr lang="en-US" dirty="0"/>
+          </a:p>
+        </p:txBody>
+      </p:sp>
+      <p:pic>
+        <p:nvPicPr>
+          <p:cNvPr id="8" name="Picture 7" descr="Graphical user interface, text&#10;&#10;Description automatically generated">
+            <a:extLst>
+              <a:ext uri="{FF2B5EF4-FFF2-40B4-BE49-F238E27FC236}">
+                <a16:creationId xmlns:a16="http://schemas.microsoft.com/office/drawing/2014/main" id="{1E034FC4-DE61-4B13-976F-2C0F51523041}"/>
+              </a:ext>
+            </a:extLst>
+          </p:cNvPr>
+          <p:cNvPicPr>
+            <a:picLocks noChangeAspect="1"/>
+          </p:cNvPicPr>
+          <p:nvPr/>
+        </p:nvPicPr>
+        <p:blipFill>
+          <a:blip r:embed="rId3">
+            <a:extLst>
+              <a:ext uri="{28A0092B-C50C-407E-A947-70E740481C1C}">
+                <a14:useLocalDpi xmlns:a14="http://schemas.microsoft.com/office/drawing/2010/main" val="0"/>
+              </a:ext>
+            </a:extLst>
+          </a:blip>
+          <a:stretch>
+            <a:fillRect/>
+          </a:stretch>
+        </p:blipFill>
+        <p:spPr>
+          <a:xfrm>
+            <a:off x="1597891" y="3804125"/>
+            <a:ext cx="6797964" cy="2582523"/>
+          </a:xfrm>
+          <a:prstGeom prst="rect">
+            <a:avLst/>
+          </a:prstGeom>
+        </p:spPr>
+      </p:pic>
     </p:spTree>
     <p:extLst>
       <p:ext uri="{BB962C8B-B14F-4D97-AF65-F5344CB8AC3E}">
-        <p14:creationId xmlns:p14="http://schemas.microsoft.com/office/powerpoint/2010/main" val="348564874"/>
+        <p14:creationId xmlns:p14="http://schemas.microsoft.com/office/powerpoint/2010/main" val="1870706530"/>
       </p:ext>
     </p:extLst>
   </p:cSld>

</xml_diff>